<commit_message>
End of the project
</commit_message>
<xml_diff>
--- a/PHP/Slide show/Lore_Pedia_Presentation.pptx
+++ b/PHP/Slide show/Lore_Pedia_Presentation.pptx
@@ -3581,18 +3581,7 @@
                   <a:ea typeface="A Hayat" panose="020B0800040000020004" pitchFamily="34" charset="-78"/>
                   <a:cs typeface="A Hayat" panose="020B0800040000020004" pitchFamily="34" charset="-78"/>
                 </a:rPr>
-                <a:t>10</a:t>
-              </a:r>
-              <a:r>
-                <a:rPr lang="fa-IR" dirty="0" smtClean="0">
-                  <a:solidFill>
-                    <a:schemeClr val="bg1"/>
-                  </a:solidFill>
-                  <a:latin typeface="A Hayat" panose="020B0800040000020004" pitchFamily="34" charset="-78"/>
-                  <a:ea typeface="A Hayat" panose="020B0800040000020004" pitchFamily="34" charset="-78"/>
-                  <a:cs typeface="A Hayat" panose="020B0800040000020004" pitchFamily="34" charset="-78"/>
-                </a:rPr>
-                <a:t>/10</a:t>
+                <a:t>10/10</a:t>
               </a:r>
               <a:endParaRPr dirty="0">
                 <a:solidFill>
@@ -4764,12 +4753,6 @@
                 </a:rPr>
                 <a:t>لور-پدیا</a:t>
               </a:r>
-              <a:r>
-                <a:rPr lang="fa-IR" sz="4800" dirty="0" smtClean="0">
-                  <a:cs typeface="B Homa" panose="00000400000000000000" pitchFamily="2" charset="-78"/>
-                </a:rPr>
-                <a:t/>
-              </a:r>
               <a:br>
                 <a:rPr lang="fa-IR" sz="4800" dirty="0" smtClean="0">
                   <a:cs typeface="B Homa" panose="00000400000000000000" pitchFamily="2" charset="-78"/>
@@ -6215,18 +6198,7 @@
                   <a:ea typeface="A Hayat" panose="020B0800040000020004" pitchFamily="34" charset="-78"/>
                   <a:cs typeface="A Hayat" panose="020B0800040000020004" pitchFamily="34" charset="-78"/>
                 </a:rPr>
-                <a:t>6</a:t>
-              </a:r>
-              <a:r>
-                <a:rPr lang="fa-IR" dirty="0" smtClean="0">
-                  <a:solidFill>
-                    <a:schemeClr val="bg1"/>
-                  </a:solidFill>
-                  <a:latin typeface="A Hayat" panose="020B0800040000020004" pitchFamily="34" charset="-78"/>
-                  <a:ea typeface="A Hayat" panose="020B0800040000020004" pitchFamily="34" charset="-78"/>
-                  <a:cs typeface="A Hayat" panose="020B0800040000020004" pitchFamily="34" charset="-78"/>
-                </a:rPr>
-                <a:t>/10</a:t>
+                <a:t>6/10</a:t>
               </a:r>
               <a:endParaRPr dirty="0">
                 <a:solidFill>
@@ -7123,18 +7095,7 @@
                   <a:ea typeface="A Hayat" panose="020B0800040000020004" pitchFamily="34" charset="-78"/>
                   <a:cs typeface="A Hayat" panose="020B0800040000020004" pitchFamily="34" charset="-78"/>
                 </a:rPr>
-                <a:t>7</a:t>
-              </a:r>
-              <a:r>
-                <a:rPr lang="fa-IR" dirty="0" smtClean="0">
-                  <a:solidFill>
-                    <a:schemeClr val="bg1"/>
-                  </a:solidFill>
-                  <a:latin typeface="A Hayat" panose="020B0800040000020004" pitchFamily="34" charset="-78"/>
-                  <a:ea typeface="A Hayat" panose="020B0800040000020004" pitchFamily="34" charset="-78"/>
-                  <a:cs typeface="A Hayat" panose="020B0800040000020004" pitchFamily="34" charset="-78"/>
-                </a:rPr>
-                <a:t>/10</a:t>
+                <a:t>7/10</a:t>
               </a:r>
               <a:endParaRPr dirty="0">
                 <a:solidFill>
@@ -7191,10 +7152,6 @@
                 </a:rPr>
                 <a:t>تحلیل و بررسی</a:t>
               </a:r>
-              <a:endParaRPr lang="fa-IR" sz="3600" dirty="0">
-                <a:latin typeface="B Nazanin"/>
-                <a:cs typeface="B Homa" panose="00000400000000000000" pitchFamily="2" charset="-78"/>
-              </a:endParaRPr>
             </a:p>
           </p:txBody>
         </p:sp>
@@ -7868,18 +7825,7 @@
                   <a:ea typeface="A Hayat" panose="020B0800040000020004" pitchFamily="34" charset="-78"/>
                   <a:cs typeface="A Hayat" panose="020B0800040000020004" pitchFamily="34" charset="-78"/>
                 </a:rPr>
-                <a:t>8</a:t>
-              </a:r>
-              <a:r>
-                <a:rPr lang="fa-IR" dirty="0" smtClean="0">
-                  <a:solidFill>
-                    <a:schemeClr val="bg1"/>
-                  </a:solidFill>
-                  <a:latin typeface="A Hayat" panose="020B0800040000020004" pitchFamily="34" charset="-78"/>
-                  <a:ea typeface="A Hayat" panose="020B0800040000020004" pitchFamily="34" charset="-78"/>
-                  <a:cs typeface="A Hayat" panose="020B0800040000020004" pitchFamily="34" charset="-78"/>
-                </a:rPr>
-                <a:t>/10</a:t>
+                <a:t>8/10</a:t>
               </a:r>
               <a:endParaRPr dirty="0">
                 <a:solidFill>
@@ -7936,10 +7882,6 @@
                 </a:rPr>
                 <a:t>نتیجه‌گیری</a:t>
               </a:r>
-              <a:endParaRPr lang="fa-IR" sz="3600" dirty="0">
-                <a:latin typeface="B Nazanin"/>
-                <a:cs typeface="B Homa" panose="00000400000000000000" pitchFamily="2" charset="-78"/>
-              </a:endParaRPr>
             </a:p>
           </p:txBody>
         </p:sp>
@@ -8328,18 +8270,7 @@
                   <a:ea typeface="A Hayat" panose="020B0800040000020004" pitchFamily="34" charset="-78"/>
                   <a:cs typeface="A Hayat" panose="020B0800040000020004" pitchFamily="34" charset="-78"/>
                 </a:rPr>
-                <a:t>9</a:t>
-              </a:r>
-              <a:r>
-                <a:rPr lang="fa-IR" dirty="0" smtClean="0">
-                  <a:solidFill>
-                    <a:schemeClr val="bg1"/>
-                  </a:solidFill>
-                  <a:latin typeface="A Hayat" panose="020B0800040000020004" pitchFamily="34" charset="-78"/>
-                  <a:ea typeface="A Hayat" panose="020B0800040000020004" pitchFamily="34" charset="-78"/>
-                  <a:cs typeface="A Hayat" panose="020B0800040000020004" pitchFamily="34" charset="-78"/>
-                </a:rPr>
-                <a:t>/10</a:t>
+                <a:t>9/10</a:t>
               </a:r>
               <a:endParaRPr dirty="0">
                 <a:solidFill>
@@ -8404,6 +8335,766 @@
           </p:txBody>
         </p:sp>
       </p:grpSp>
+      <p:sp>
+        <p:nvSpPr>
+          <p:cNvPr id="11" name="Rectangle 3"/>
+          <p:cNvSpPr>
+            <a:spLocks noChangeArrowheads="1"/>
+          </p:cNvSpPr>
+          <p:nvPr/>
+        </p:nvSpPr>
+        <p:spPr bwMode="auto">
+          <a:xfrm>
+            <a:off x="274321" y="955370"/>
+            <a:ext cx="8735864" cy="4154984"/>
+          </a:xfrm>
+          <a:prstGeom prst="rect">
+            <a:avLst/>
+          </a:prstGeom>
+          <a:noFill/>
+          <a:ln>
+            <a:noFill/>
+          </a:ln>
+          <a:effectLst/>
+          <a:extLst>
+            <a:ext uri="{909E8E84-426E-40DD-AFC4-6F175D3DCCD1}">
+              <a14:hiddenFill xmlns:a14="http://schemas.microsoft.com/office/drawing/2010/main">
+                <a:solidFill>
+                  <a:schemeClr val="accent1"/>
+                </a:solidFill>
+              </a14:hiddenFill>
+            </a:ext>
+            <a:ext uri="{91240B29-F687-4F45-9708-019B960494DF}">
+              <a14:hiddenLine xmlns:a14="http://schemas.microsoft.com/office/drawing/2010/main" w="9525">
+                <a:solidFill>
+                  <a:schemeClr val="tx1"/>
+                </a:solidFill>
+                <a:miter lim="800000"/>
+                <a:headEnd/>
+                <a:tailEnd/>
+              </a14:hiddenLine>
+            </a:ext>
+            <a:ext uri="{AF507438-7753-43E0-B8FC-AC1667EBCBE1}">
+              <a14:hiddenEffects xmlns:a14="http://schemas.microsoft.com/office/drawing/2010/main">
+                <a:effectLst>
+                  <a:outerShdw dist="35921" dir="2700000" algn="ctr" rotWithShape="0">
+                    <a:schemeClr val="bg2"/>
+                  </a:outerShdw>
+                </a:effectLst>
+              </a14:hiddenEffects>
+            </a:ext>
+          </a:extLst>
+        </p:spPr>
+        <p:txBody>
+          <a:bodyPr vert="horz" wrap="square" lIns="91440" tIns="45720" rIns="91440" bIns="45720" numCol="1" anchor="ctr" anchorCtr="0" compatLnSpc="1">
+            <a:prstTxWarp prst="textNoShape">
+              <a:avLst/>
+            </a:prstTxWarp>
+            <a:spAutoFit/>
+          </a:bodyPr>
+          <a:lstStyle/>
+          <a:p>
+            <a:pPr marL="0" marR="0" lvl="0" indent="0" algn="r" defTabSz="914400" rtl="1" eaLnBrk="0" fontAlgn="base" latinLnBrk="0" hangingPunct="0">
+              <a:lnSpc>
+                <a:spcPct val="100000"/>
+              </a:lnSpc>
+              <a:spcBef>
+                <a:spcPct val="0"/>
+              </a:spcBef>
+              <a:spcAft>
+                <a:spcPct val="0"/>
+              </a:spcAft>
+              <a:buClrTx/>
+              <a:buSzTx/>
+              <a:buFontTx/>
+              <a:buChar char="•"/>
+              <a:tabLst/>
+            </a:pPr>
+            <a:r>
+              <a:rPr kumimoji="0" lang="fa-IR" altLang="fa-IR" sz="2400" b="0" i="0" u="none" strike="noStrike" cap="none" normalizeH="0" baseline="0" dirty="0" smtClean="0">
+                <a:ln>
+                  <a:noFill/>
+                </a:ln>
+                <a:solidFill>
+                  <a:schemeClr val="tx1"/>
+                </a:solidFill>
+                <a:effectLst/>
+                <a:latin typeface="Arial" panose="020B0604020202020204" pitchFamily="34" charset="0"/>
+                <a:cs typeface="B Homa" panose="00000400000000000000" pitchFamily="2" charset="-78"/>
+              </a:rPr>
+              <a:t> </a:t>
+            </a:r>
+            <a:r>
+              <a:rPr kumimoji="0" lang="ar-SA" altLang="fa-IR" sz="2400" b="0" i="0" u="none" strike="noStrike" cap="none" normalizeH="0" baseline="0" dirty="0" smtClean="0">
+                <a:ln>
+                  <a:noFill/>
+                </a:ln>
+                <a:solidFill>
+                  <a:schemeClr val="tx1"/>
+                </a:solidFill>
+                <a:effectLst/>
+                <a:latin typeface="Arial" panose="020B0604020202020204" pitchFamily="34" charset="0"/>
+                <a:cs typeface="B Homa" panose="00000400000000000000" pitchFamily="2" charset="-78"/>
+              </a:rPr>
+              <a:t>جزوات و آموزش‌های دروس تخصصی رشته نرم‌افزار – دانشکده فنی و حرفه‌ای الغدیر زنجان</a:t>
+            </a:r>
+            <a:r>
+              <a:rPr kumimoji="0" lang="fa-IR" altLang="fa-IR" sz="2400" b="0" i="0" u="none" strike="noStrike" cap="none" normalizeH="0" baseline="0" dirty="0" smtClean="0">
+                <a:ln>
+                  <a:noFill/>
+                </a:ln>
+                <a:solidFill>
+                  <a:schemeClr val="tx1"/>
+                </a:solidFill>
+                <a:effectLst/>
+                <a:latin typeface="Arial" panose="020B0604020202020204" pitchFamily="34" charset="0"/>
+                <a:cs typeface="B Homa" panose="00000400000000000000" pitchFamily="2" charset="-78"/>
+              </a:rPr>
+              <a:t/>
+            </a:r>
+            <a:br>
+              <a:rPr kumimoji="0" lang="fa-IR" altLang="fa-IR" sz="2400" b="0" i="0" u="none" strike="noStrike" cap="none" normalizeH="0" baseline="0" dirty="0" smtClean="0">
+                <a:ln>
+                  <a:noFill/>
+                </a:ln>
+                <a:solidFill>
+                  <a:schemeClr val="tx1"/>
+                </a:solidFill>
+                <a:effectLst/>
+                <a:latin typeface="Arial" panose="020B0604020202020204" pitchFamily="34" charset="0"/>
+                <a:cs typeface="B Homa" panose="00000400000000000000" pitchFamily="2" charset="-78"/>
+              </a:rPr>
+            </a:br>
+            <a:endParaRPr kumimoji="0" lang="fa-IR" altLang="fa-IR" sz="2400" b="0" i="0" u="none" strike="noStrike" cap="none" normalizeH="0" baseline="0" dirty="0" smtClean="0">
+              <a:ln>
+                <a:noFill/>
+              </a:ln>
+              <a:solidFill>
+                <a:schemeClr val="tx1"/>
+              </a:solidFill>
+              <a:effectLst/>
+              <a:latin typeface="Arial" panose="020B0604020202020204" pitchFamily="34" charset="0"/>
+              <a:cs typeface="B Homa" panose="00000400000000000000" pitchFamily="2" charset="-78"/>
+            </a:endParaRPr>
+          </a:p>
+          <a:p>
+            <a:pPr marL="0" marR="0" lvl="0" indent="0" algn="r" defTabSz="914400" rtl="1" eaLnBrk="0" fontAlgn="base" latinLnBrk="0" hangingPunct="0">
+              <a:lnSpc>
+                <a:spcPct val="100000"/>
+              </a:lnSpc>
+              <a:spcBef>
+                <a:spcPct val="0"/>
+              </a:spcBef>
+              <a:spcAft>
+                <a:spcPct val="0"/>
+              </a:spcAft>
+              <a:buClrTx/>
+              <a:buSzTx/>
+              <a:buFontTx/>
+              <a:buChar char="•"/>
+              <a:tabLst/>
+            </a:pPr>
+            <a:r>
+              <a:rPr kumimoji="0" lang="fa-IR" altLang="fa-IR" sz="2400" b="0" i="0" u="none" strike="noStrike" cap="none" normalizeH="0" baseline="0" dirty="0" smtClean="0">
+                <a:ln>
+                  <a:noFill/>
+                </a:ln>
+                <a:solidFill>
+                  <a:schemeClr val="tx1"/>
+                </a:solidFill>
+                <a:effectLst/>
+                <a:latin typeface="Arial" panose="020B0604020202020204" pitchFamily="34" charset="0"/>
+                <a:cs typeface="B Homa" panose="00000400000000000000" pitchFamily="2" charset="-78"/>
+              </a:rPr>
+              <a:t> </a:t>
+            </a:r>
+            <a:r>
+              <a:rPr kumimoji="0" lang="ar-SA" altLang="fa-IR" sz="2400" b="0" i="0" u="none" strike="noStrike" cap="none" normalizeH="0" baseline="0" dirty="0" smtClean="0">
+                <a:ln>
+                  <a:noFill/>
+                </a:ln>
+                <a:solidFill>
+                  <a:schemeClr val="tx1"/>
+                </a:solidFill>
+                <a:effectLst/>
+                <a:latin typeface="Arial" panose="020B0604020202020204" pitchFamily="34" charset="0"/>
+                <a:cs typeface="B Homa" panose="00000400000000000000" pitchFamily="2" charset="-78"/>
+              </a:rPr>
+              <a:t>منابع درسی دوره کاردانی</a:t>
+            </a:r>
+            <a:r>
+              <a:rPr kumimoji="0" lang="fa-IR" altLang="fa-IR" sz="2400" b="0" i="0" u="none" strike="noStrike" cap="none" normalizeH="0" baseline="0" dirty="0" smtClean="0">
+                <a:ln>
+                  <a:noFill/>
+                </a:ln>
+                <a:solidFill>
+                  <a:schemeClr val="tx1"/>
+                </a:solidFill>
+                <a:effectLst/>
+                <a:latin typeface="Arial" panose="020B0604020202020204" pitchFamily="34" charset="0"/>
+                <a:cs typeface="B Homa" panose="00000400000000000000" pitchFamily="2" charset="-78"/>
+              </a:rPr>
+              <a:t> (</a:t>
+            </a:r>
+            <a:r>
+              <a:rPr kumimoji="0" lang="ar-SA" altLang="fa-IR" sz="2400" b="0" i="0" u="none" strike="noStrike" cap="none" normalizeH="0" baseline="0" dirty="0" smtClean="0">
+                <a:ln>
+                  <a:noFill/>
+                </a:ln>
+                <a:solidFill>
+                  <a:schemeClr val="tx1"/>
+                </a:solidFill>
+                <a:effectLst/>
+                <a:latin typeface="Arial" panose="020B0604020202020204" pitchFamily="34" charset="0"/>
+                <a:cs typeface="B Homa" panose="00000400000000000000" pitchFamily="2" charset="-78"/>
+              </a:rPr>
+              <a:t>طراحی وب، پایگاه داده، زبان</a:t>
+            </a:r>
+            <a:r>
+              <a:rPr kumimoji="0" lang="fa-IR" altLang="fa-IR" sz="2400" b="0" i="0" u="none" strike="noStrike" cap="none" normalizeH="0" baseline="0" dirty="0" smtClean="0">
+                <a:ln>
+                  <a:noFill/>
+                </a:ln>
+                <a:solidFill>
+                  <a:schemeClr val="tx1"/>
+                </a:solidFill>
+                <a:effectLst/>
+                <a:latin typeface="Arial" panose="020B0604020202020204" pitchFamily="34" charset="0"/>
+                <a:cs typeface="B Homa" panose="00000400000000000000" pitchFamily="2" charset="-78"/>
+              </a:rPr>
+              <a:t> </a:t>
+            </a:r>
+            <a:r>
+              <a:rPr kumimoji="0" lang="fa-IR" altLang="fa-IR" sz="2400" b="0" i="0" u="none" strike="noStrike" cap="none" normalizeH="0" baseline="0" dirty="0" smtClean="0">
+                <a:ln>
+                  <a:noFill/>
+                </a:ln>
+                <a:solidFill>
+                  <a:schemeClr val="tx1"/>
+                </a:solidFill>
+                <a:effectLst/>
+                <a:latin typeface="A Hayat" panose="020B0800040000020004" pitchFamily="34" charset="-78"/>
+                <a:ea typeface="A Hayat" panose="020B0800040000020004" pitchFamily="34" charset="-78"/>
+                <a:cs typeface="A Hayat" panose="020B0800040000020004" pitchFamily="34" charset="-78"/>
+              </a:rPr>
+              <a:t>PHP</a:t>
+            </a:r>
+            <a:r>
+              <a:rPr kumimoji="0" lang="fa-IR" altLang="fa-IR" sz="2400" b="0" i="0" u="none" strike="noStrike" cap="none" normalizeH="0" baseline="0" dirty="0" smtClean="0">
+                <a:ln>
+                  <a:noFill/>
+                </a:ln>
+                <a:solidFill>
+                  <a:schemeClr val="tx1"/>
+                </a:solidFill>
+                <a:effectLst/>
+                <a:latin typeface="Arial" panose="020B0604020202020204" pitchFamily="34" charset="0"/>
+                <a:cs typeface="B Homa" panose="00000400000000000000" pitchFamily="2" charset="-78"/>
+              </a:rPr>
+              <a:t> </a:t>
+            </a:r>
+            <a:r>
+              <a:rPr kumimoji="0" lang="ar-SA" altLang="fa-IR" sz="2400" b="0" i="0" u="none" strike="noStrike" cap="none" normalizeH="0" baseline="0" dirty="0" smtClean="0">
+                <a:ln>
+                  <a:noFill/>
+                </a:ln>
+                <a:solidFill>
+                  <a:schemeClr val="tx1"/>
+                </a:solidFill>
+                <a:effectLst/>
+                <a:latin typeface="Arial" panose="020B0604020202020204" pitchFamily="34" charset="0"/>
+                <a:cs typeface="B Homa" panose="00000400000000000000" pitchFamily="2" charset="-78"/>
+              </a:rPr>
+              <a:t>و</a:t>
+            </a:r>
+            <a:r>
+              <a:rPr kumimoji="0" lang="fa-IR" altLang="fa-IR" sz="2400" b="0" i="0" u="none" strike="noStrike" cap="none" normalizeH="0" baseline="0" dirty="0" smtClean="0">
+                <a:ln>
+                  <a:noFill/>
+                </a:ln>
+                <a:solidFill>
+                  <a:schemeClr val="tx1"/>
+                </a:solidFill>
+                <a:effectLst/>
+                <a:latin typeface="Arial" panose="020B0604020202020204" pitchFamily="34" charset="0"/>
+                <a:cs typeface="B Homa" panose="00000400000000000000" pitchFamily="2" charset="-78"/>
+              </a:rPr>
+              <a:t>...)</a:t>
+            </a:r>
+            <a:br>
+              <a:rPr kumimoji="0" lang="fa-IR" altLang="fa-IR" sz="2400" b="0" i="0" u="none" strike="noStrike" cap="none" normalizeH="0" baseline="0" dirty="0" smtClean="0">
+                <a:ln>
+                  <a:noFill/>
+                </a:ln>
+                <a:solidFill>
+                  <a:schemeClr val="tx1"/>
+                </a:solidFill>
+                <a:effectLst/>
+                <a:latin typeface="Arial" panose="020B0604020202020204" pitchFamily="34" charset="0"/>
+                <a:cs typeface="B Homa" panose="00000400000000000000" pitchFamily="2" charset="-78"/>
+              </a:rPr>
+            </a:br>
+            <a:endParaRPr kumimoji="0" lang="fa-IR" altLang="fa-IR" sz="2400" b="0" i="0" u="none" strike="noStrike" cap="none" normalizeH="0" baseline="0" dirty="0" smtClean="0">
+              <a:ln>
+                <a:noFill/>
+              </a:ln>
+              <a:solidFill>
+                <a:schemeClr val="tx1"/>
+              </a:solidFill>
+              <a:effectLst/>
+              <a:latin typeface="Arial" panose="020B0604020202020204" pitchFamily="34" charset="0"/>
+              <a:cs typeface="B Homa" panose="00000400000000000000" pitchFamily="2" charset="-78"/>
+            </a:endParaRPr>
+          </a:p>
+          <a:p>
+            <a:pPr marL="0" marR="0" lvl="0" indent="0" algn="r" defTabSz="914400" rtl="1" eaLnBrk="0" fontAlgn="base" latinLnBrk="0" hangingPunct="0">
+              <a:lnSpc>
+                <a:spcPct val="100000"/>
+              </a:lnSpc>
+              <a:spcBef>
+                <a:spcPct val="0"/>
+              </a:spcBef>
+              <a:spcAft>
+                <a:spcPct val="0"/>
+              </a:spcAft>
+              <a:buClrTx/>
+              <a:buSzTx/>
+              <a:buFontTx/>
+              <a:buChar char="•"/>
+              <a:tabLst/>
+            </a:pPr>
+            <a:r>
+              <a:rPr kumimoji="0" lang="fa-IR" altLang="fa-IR" sz="2400" b="0" i="0" u="none" strike="noStrike" cap="none" normalizeH="0" baseline="0" dirty="0" smtClean="0">
+                <a:ln>
+                  <a:noFill/>
+                </a:ln>
+                <a:solidFill>
+                  <a:schemeClr val="tx1"/>
+                </a:solidFill>
+                <a:effectLst/>
+                <a:latin typeface="Arial" panose="020B0604020202020204" pitchFamily="34" charset="0"/>
+                <a:cs typeface="B Homa" panose="00000400000000000000" pitchFamily="2" charset="-78"/>
+              </a:rPr>
+              <a:t> </a:t>
+            </a:r>
+            <a:r>
+              <a:rPr kumimoji="0" lang="ar-SA" altLang="fa-IR" sz="2400" b="0" i="0" u="none" strike="noStrike" cap="none" normalizeH="0" baseline="0" dirty="0" smtClean="0">
+                <a:ln>
+                  <a:noFill/>
+                </a:ln>
+                <a:solidFill>
+                  <a:schemeClr val="tx1"/>
+                </a:solidFill>
+                <a:effectLst/>
+                <a:latin typeface="Arial" panose="020B0604020202020204" pitchFamily="34" charset="0"/>
+                <a:cs typeface="B Homa" panose="00000400000000000000" pitchFamily="2" charset="-78"/>
+              </a:rPr>
+              <a:t>وب‌سایت</a:t>
+            </a:r>
+            <a:r>
+              <a:rPr kumimoji="0" lang="fa-IR" altLang="fa-IR" sz="2400" b="0" i="0" u="none" strike="noStrike" cap="none" normalizeH="0" baseline="0" dirty="0" smtClean="0">
+                <a:ln>
+                  <a:noFill/>
+                </a:ln>
+                <a:solidFill>
+                  <a:schemeClr val="tx1"/>
+                </a:solidFill>
+                <a:effectLst/>
+                <a:latin typeface="Arial" panose="020B0604020202020204" pitchFamily="34" charset="0"/>
+                <a:cs typeface="B Homa" panose="00000400000000000000" pitchFamily="2" charset="-78"/>
+              </a:rPr>
+              <a:t> </a:t>
+            </a:r>
+            <a:r>
+              <a:rPr kumimoji="0" lang="fa-IR" altLang="fa-IR" sz="2400" b="0" i="0" u="none" strike="noStrike" cap="none" normalizeH="0" baseline="0" dirty="0" smtClean="0">
+                <a:ln>
+                  <a:noFill/>
+                </a:ln>
+                <a:solidFill>
+                  <a:schemeClr val="tx1"/>
+                </a:solidFill>
+                <a:effectLst/>
+                <a:latin typeface="A Hayat" panose="020B0800040000020004" pitchFamily="34" charset="-78"/>
+                <a:ea typeface="A Hayat" panose="020B0800040000020004" pitchFamily="34" charset="-78"/>
+                <a:cs typeface="A Hayat" panose="020B0800040000020004" pitchFamily="34" charset="-78"/>
+              </a:rPr>
+              <a:t>W3Schools</a:t>
+            </a:r>
+            <a:r>
+              <a:rPr kumimoji="0" lang="fa-IR" altLang="fa-IR" sz="2400" b="0" i="0" u="none" strike="noStrike" cap="none" normalizeH="0" baseline="0" dirty="0" smtClean="0">
+                <a:ln>
+                  <a:noFill/>
+                </a:ln>
+                <a:solidFill>
+                  <a:schemeClr val="tx1"/>
+                </a:solidFill>
+                <a:effectLst/>
+                <a:latin typeface="Arial" panose="020B0604020202020204" pitchFamily="34" charset="0"/>
+                <a:cs typeface="B Homa" panose="00000400000000000000" pitchFamily="2" charset="-78"/>
+              </a:rPr>
+              <a:t> – </a:t>
+            </a:r>
+            <a:r>
+              <a:rPr kumimoji="0" lang="ar-SA" altLang="fa-IR" sz="2400" b="0" i="0" u="none" strike="noStrike" cap="none" normalizeH="0" baseline="0" dirty="0" smtClean="0">
+                <a:ln>
+                  <a:noFill/>
+                </a:ln>
+                <a:solidFill>
+                  <a:schemeClr val="tx1"/>
+                </a:solidFill>
+                <a:effectLst/>
+                <a:latin typeface="Arial" panose="020B0604020202020204" pitchFamily="34" charset="0"/>
+                <a:cs typeface="B Homa" panose="00000400000000000000" pitchFamily="2" charset="-78"/>
+              </a:rPr>
+              <a:t>برای بررسی نمونه کدهای</a:t>
+            </a:r>
+            <a:r>
+              <a:rPr kumimoji="0" lang="fa-IR" altLang="fa-IR" sz="2400" b="0" i="0" u="none" strike="noStrike" cap="none" normalizeH="0" baseline="0" dirty="0" smtClean="0">
+                <a:ln>
+                  <a:noFill/>
+                </a:ln>
+                <a:solidFill>
+                  <a:schemeClr val="tx1"/>
+                </a:solidFill>
+                <a:effectLst/>
+                <a:latin typeface="Arial" panose="020B0604020202020204" pitchFamily="34" charset="0"/>
+                <a:cs typeface="B Homa" panose="00000400000000000000" pitchFamily="2" charset="-78"/>
+              </a:rPr>
+              <a:t> </a:t>
+            </a:r>
+            <a:r>
+              <a:rPr kumimoji="0" lang="fa-IR" altLang="fa-IR" sz="2400" b="0" i="0" u="none" strike="noStrike" cap="none" normalizeH="0" baseline="0" dirty="0" smtClean="0">
+                <a:ln>
+                  <a:noFill/>
+                </a:ln>
+                <a:solidFill>
+                  <a:schemeClr val="tx1"/>
+                </a:solidFill>
+                <a:effectLst/>
+                <a:latin typeface="A Hayat" panose="020B0800040000020004" pitchFamily="34" charset="-78"/>
+                <a:ea typeface="A Hayat" panose="020B0800040000020004" pitchFamily="34" charset="-78"/>
+                <a:cs typeface="A Hayat" panose="020B0800040000020004" pitchFamily="34" charset="-78"/>
+              </a:rPr>
+              <a:t>HTML</a:t>
+            </a:r>
+            <a:r>
+              <a:rPr kumimoji="0" lang="fa-IR" altLang="fa-IR" sz="2400" b="0" i="0" u="none" strike="noStrike" cap="none" normalizeH="0" baseline="0" dirty="0" smtClean="0">
+                <a:ln>
+                  <a:noFill/>
+                </a:ln>
+                <a:solidFill>
+                  <a:schemeClr val="tx1"/>
+                </a:solidFill>
+                <a:effectLst/>
+                <a:latin typeface="Arial" panose="020B0604020202020204" pitchFamily="34" charset="0"/>
+                <a:cs typeface="B Homa" panose="00000400000000000000" pitchFamily="2" charset="-78"/>
+              </a:rPr>
+              <a:t>، </a:t>
+            </a:r>
+            <a:r>
+              <a:rPr kumimoji="0" lang="fa-IR" altLang="fa-IR" sz="2400" b="0" i="0" u="none" strike="noStrike" cap="none" normalizeH="0" baseline="0" dirty="0" smtClean="0">
+                <a:ln>
+                  <a:noFill/>
+                </a:ln>
+                <a:solidFill>
+                  <a:schemeClr val="tx1"/>
+                </a:solidFill>
+                <a:effectLst/>
+                <a:latin typeface="A Hayat" panose="020B0800040000020004" pitchFamily="34" charset="-78"/>
+                <a:ea typeface="A Hayat" panose="020B0800040000020004" pitchFamily="34" charset="-78"/>
+                <a:cs typeface="A Hayat" panose="020B0800040000020004" pitchFamily="34" charset="-78"/>
+              </a:rPr>
+              <a:t>CSS</a:t>
+            </a:r>
+            <a:r>
+              <a:rPr kumimoji="0" lang="fa-IR" altLang="fa-IR" sz="2400" b="0" i="0" u="none" strike="noStrike" cap="none" normalizeH="0" baseline="0" dirty="0" smtClean="0">
+                <a:ln>
+                  <a:noFill/>
+                </a:ln>
+                <a:solidFill>
+                  <a:schemeClr val="tx1"/>
+                </a:solidFill>
+                <a:effectLst/>
+                <a:latin typeface="Arial" panose="020B0604020202020204" pitchFamily="34" charset="0"/>
+                <a:cs typeface="B Homa" panose="00000400000000000000" pitchFamily="2" charset="-78"/>
+              </a:rPr>
+              <a:t>، </a:t>
+            </a:r>
+            <a:r>
+              <a:rPr kumimoji="0" lang="fa-IR" altLang="fa-IR" sz="2400" b="0" i="0" u="none" strike="noStrike" cap="none" normalizeH="0" baseline="0" dirty="0" smtClean="0">
+                <a:ln>
+                  <a:noFill/>
+                </a:ln>
+                <a:solidFill>
+                  <a:schemeClr val="tx1"/>
+                </a:solidFill>
+                <a:effectLst/>
+                <a:latin typeface="A Hayat" panose="020B0800040000020004" pitchFamily="34" charset="-78"/>
+                <a:ea typeface="A Hayat" panose="020B0800040000020004" pitchFamily="34" charset="-78"/>
+                <a:cs typeface="A Hayat" panose="020B0800040000020004" pitchFamily="34" charset="-78"/>
+              </a:rPr>
+              <a:t>JavaScript</a:t>
+            </a:r>
+            <a:r>
+              <a:rPr kumimoji="0" lang="fa-IR" altLang="fa-IR" sz="2400" b="0" i="0" u="none" strike="noStrike" cap="none" normalizeH="0" baseline="0" dirty="0" smtClean="0">
+                <a:ln>
+                  <a:noFill/>
+                </a:ln>
+                <a:solidFill>
+                  <a:schemeClr val="tx1"/>
+                </a:solidFill>
+                <a:effectLst/>
+                <a:latin typeface="Arial" panose="020B0604020202020204" pitchFamily="34" charset="0"/>
+                <a:cs typeface="B Homa" panose="00000400000000000000" pitchFamily="2" charset="-78"/>
+              </a:rPr>
+              <a:t> </a:t>
+            </a:r>
+            <a:r>
+              <a:rPr kumimoji="0" lang="ar-SA" altLang="fa-IR" sz="2400" b="0" i="0" u="none" strike="noStrike" cap="none" normalizeH="0" baseline="0" dirty="0" smtClean="0">
+                <a:ln>
+                  <a:noFill/>
+                </a:ln>
+                <a:solidFill>
+                  <a:schemeClr val="tx1"/>
+                </a:solidFill>
+                <a:effectLst/>
+                <a:latin typeface="Arial" panose="020B0604020202020204" pitchFamily="34" charset="0"/>
+                <a:cs typeface="B Homa" panose="00000400000000000000" pitchFamily="2" charset="-78"/>
+              </a:rPr>
+              <a:t>و</a:t>
+            </a:r>
+            <a:r>
+              <a:rPr kumimoji="0" lang="fa-IR" altLang="fa-IR" sz="2400" b="0" i="0" u="none" strike="noStrike" cap="none" normalizeH="0" baseline="0" dirty="0" smtClean="0">
+                <a:ln>
+                  <a:noFill/>
+                </a:ln>
+                <a:solidFill>
+                  <a:schemeClr val="tx1"/>
+                </a:solidFill>
+                <a:effectLst/>
+                <a:latin typeface="Arial" panose="020B0604020202020204" pitchFamily="34" charset="0"/>
+                <a:cs typeface="B Homa" panose="00000400000000000000" pitchFamily="2" charset="-78"/>
+              </a:rPr>
+              <a:t> </a:t>
+            </a:r>
+            <a:r>
+              <a:rPr kumimoji="0" lang="fa-IR" altLang="fa-IR" sz="2400" b="0" i="0" u="none" strike="noStrike" cap="none" normalizeH="0" baseline="0" dirty="0" smtClean="0">
+                <a:ln>
+                  <a:noFill/>
+                </a:ln>
+                <a:solidFill>
+                  <a:schemeClr val="tx1"/>
+                </a:solidFill>
+                <a:effectLst/>
+                <a:latin typeface="A Hayat" panose="020B0800040000020004" pitchFamily="34" charset="-78"/>
+                <a:ea typeface="A Hayat" panose="020B0800040000020004" pitchFamily="34" charset="-78"/>
+                <a:cs typeface="A Hayat" panose="020B0800040000020004" pitchFamily="34" charset="-78"/>
+              </a:rPr>
+              <a:t>PHP</a:t>
+            </a:r>
+            <a:br>
+              <a:rPr kumimoji="0" lang="fa-IR" altLang="fa-IR" sz="2400" b="0" i="0" u="none" strike="noStrike" cap="none" normalizeH="0" baseline="0" dirty="0" smtClean="0">
+                <a:ln>
+                  <a:noFill/>
+                </a:ln>
+                <a:solidFill>
+                  <a:schemeClr val="tx1"/>
+                </a:solidFill>
+                <a:effectLst/>
+                <a:latin typeface="A Hayat" panose="020B0800040000020004" pitchFamily="34" charset="-78"/>
+                <a:ea typeface="A Hayat" panose="020B0800040000020004" pitchFamily="34" charset="-78"/>
+                <a:cs typeface="A Hayat" panose="020B0800040000020004" pitchFamily="34" charset="-78"/>
+              </a:rPr>
+            </a:br>
+            <a:endParaRPr kumimoji="0" lang="fa-IR" altLang="fa-IR" sz="2400" b="0" i="0" u="none" strike="noStrike" cap="none" normalizeH="0" baseline="0" dirty="0" smtClean="0">
+              <a:ln>
+                <a:noFill/>
+              </a:ln>
+              <a:solidFill>
+                <a:schemeClr val="tx1"/>
+              </a:solidFill>
+              <a:effectLst/>
+              <a:latin typeface="A Hayat" panose="020B0800040000020004" pitchFamily="34" charset="-78"/>
+              <a:ea typeface="A Hayat" panose="020B0800040000020004" pitchFamily="34" charset="-78"/>
+              <a:cs typeface="A Hayat" panose="020B0800040000020004" pitchFamily="34" charset="-78"/>
+            </a:endParaRPr>
+          </a:p>
+          <a:p>
+            <a:pPr marL="0" marR="0" lvl="0" indent="0" algn="r" defTabSz="914400" rtl="1" eaLnBrk="0" fontAlgn="base" latinLnBrk="0" hangingPunct="0">
+              <a:lnSpc>
+                <a:spcPct val="100000"/>
+              </a:lnSpc>
+              <a:spcBef>
+                <a:spcPct val="0"/>
+              </a:spcBef>
+              <a:spcAft>
+                <a:spcPct val="0"/>
+              </a:spcAft>
+              <a:buClrTx/>
+              <a:buSzTx/>
+              <a:buFontTx/>
+              <a:buChar char="•"/>
+              <a:tabLst/>
+            </a:pPr>
+            <a:r>
+              <a:rPr kumimoji="0" lang="fa-IR" altLang="fa-IR" sz="2400" b="0" i="0" u="none" strike="noStrike" cap="none" normalizeH="0" baseline="0" dirty="0" smtClean="0">
+                <a:ln>
+                  <a:noFill/>
+                </a:ln>
+                <a:solidFill>
+                  <a:schemeClr val="tx1"/>
+                </a:solidFill>
+                <a:effectLst/>
+                <a:latin typeface="Arial" panose="020B0604020202020204" pitchFamily="34" charset="0"/>
+                <a:cs typeface="B Homa" panose="00000400000000000000" pitchFamily="2" charset="-78"/>
+              </a:rPr>
+              <a:t> هوش مصنوعی </a:t>
+            </a:r>
+            <a:r>
+              <a:rPr kumimoji="0" lang="fa-IR" altLang="fa-IR" sz="2400" b="0" i="0" u="none" strike="noStrike" cap="none" normalizeH="0" baseline="0" dirty="0" smtClean="0">
+                <a:ln>
+                  <a:noFill/>
+                </a:ln>
+                <a:solidFill>
+                  <a:schemeClr val="tx1"/>
+                </a:solidFill>
+                <a:effectLst/>
+                <a:latin typeface="A Hayat" panose="020B0800040000020004" pitchFamily="34" charset="-78"/>
+                <a:ea typeface="A Hayat" panose="020B0800040000020004" pitchFamily="34" charset="-78"/>
+                <a:cs typeface="A Hayat" panose="020B0800040000020004" pitchFamily="34" charset="-78"/>
+              </a:rPr>
+              <a:t>ChatGPT</a:t>
+            </a:r>
+            <a:r>
+              <a:rPr kumimoji="0" lang="fa-IR" altLang="fa-IR" sz="2400" b="0" i="0" u="none" strike="noStrike" cap="none" normalizeH="0" baseline="0" dirty="0" smtClean="0">
+                <a:ln>
+                  <a:noFill/>
+                </a:ln>
+                <a:solidFill>
+                  <a:schemeClr val="tx1"/>
+                </a:solidFill>
+                <a:effectLst/>
+                <a:latin typeface="Arial" panose="020B0604020202020204" pitchFamily="34" charset="0"/>
+                <a:cs typeface="B Homa" panose="00000400000000000000" pitchFamily="2" charset="-78"/>
+              </a:rPr>
+              <a:t>– </a:t>
+            </a:r>
+            <a:r>
+              <a:rPr kumimoji="0" lang="ar-SA" altLang="fa-IR" sz="2400" b="0" i="0" u="none" strike="noStrike" cap="none" normalizeH="0" baseline="0" dirty="0" smtClean="0">
+                <a:ln>
+                  <a:noFill/>
+                </a:ln>
+                <a:solidFill>
+                  <a:schemeClr val="tx1"/>
+                </a:solidFill>
+                <a:effectLst/>
+                <a:latin typeface="Arial" panose="020B0604020202020204" pitchFamily="34" charset="0"/>
+                <a:cs typeface="B Homa" panose="00000400000000000000" pitchFamily="2" charset="-78"/>
+              </a:rPr>
+              <a:t>برای یادگیری و رفع اشکال در برخی مفاهیم و روش‌های برنامه‌نویسی</a:t>
+            </a:r>
+            <a:endParaRPr kumimoji="0" lang="fa-IR" altLang="fa-IR" sz="2400" b="0" i="0" u="none" strike="noStrike" cap="none" normalizeH="0" baseline="0" dirty="0" smtClean="0">
+              <a:ln>
+                <a:noFill/>
+              </a:ln>
+              <a:solidFill>
+                <a:schemeClr val="tx1"/>
+              </a:solidFill>
+              <a:effectLst/>
+              <a:latin typeface="Arial" panose="020B0604020202020204" pitchFamily="34" charset="0"/>
+              <a:cs typeface="B Homa" panose="00000400000000000000" pitchFamily="2" charset="-78"/>
+            </a:endParaRPr>
+          </a:p>
+          <a:p>
+            <a:pPr marL="0" marR="0" lvl="0" indent="0" algn="r" defTabSz="914400" rtl="1" eaLnBrk="0" fontAlgn="base" latinLnBrk="0" hangingPunct="0">
+              <a:lnSpc>
+                <a:spcPct val="100000"/>
+              </a:lnSpc>
+              <a:spcBef>
+                <a:spcPct val="0"/>
+              </a:spcBef>
+              <a:spcAft>
+                <a:spcPct val="0"/>
+              </a:spcAft>
+              <a:buClrTx/>
+              <a:buSzTx/>
+              <a:buFontTx/>
+              <a:buChar char="•"/>
+              <a:tabLst/>
+            </a:pPr>
+            <a:endParaRPr lang="fa-IR" altLang="fa-IR" sz="2400" dirty="0">
+              <a:latin typeface="Arial" panose="020B0604020202020204" pitchFamily="34" charset="0"/>
+              <a:cs typeface="B Homa" panose="00000400000000000000" pitchFamily="2" charset="-78"/>
+            </a:endParaRPr>
+          </a:p>
+          <a:p>
+            <a:pPr marL="0" marR="0" lvl="0" indent="0" algn="r" defTabSz="914400" rtl="1" eaLnBrk="0" fontAlgn="base" latinLnBrk="0" hangingPunct="0">
+              <a:lnSpc>
+                <a:spcPct val="100000"/>
+              </a:lnSpc>
+              <a:spcBef>
+                <a:spcPct val="0"/>
+              </a:spcBef>
+              <a:spcAft>
+                <a:spcPct val="0"/>
+              </a:spcAft>
+              <a:buClrTx/>
+              <a:buSzTx/>
+              <a:buFontTx/>
+              <a:buChar char="•"/>
+              <a:tabLst/>
+            </a:pPr>
+            <a:r>
+              <a:rPr lang="fa-IR" altLang="fa-IR" sz="2400" dirty="0" smtClean="0">
+                <a:latin typeface="Arial" panose="020B0604020202020204" pitchFamily="34" charset="0"/>
+                <a:cs typeface="B Homa" panose="00000400000000000000" pitchFamily="2" charset="-78"/>
+              </a:rPr>
+              <a:t>افزونه </a:t>
+            </a:r>
+            <a:r>
+              <a:rPr lang="en-US" altLang="fa-IR" sz="2400" dirty="0" smtClean="0">
+                <a:latin typeface="A Hayat" panose="020B0800040000020004" pitchFamily="34" charset="-78"/>
+                <a:ea typeface="A Hayat" panose="020B0800040000020004" pitchFamily="34" charset="-78"/>
+                <a:cs typeface="A Hayat" panose="020B0800040000020004" pitchFamily="34" charset="-78"/>
+              </a:rPr>
+              <a:t>Bootstrap 5</a:t>
+            </a:r>
+            <a:r>
+              <a:rPr lang="fa-IR" altLang="fa-IR" sz="2400" dirty="0" smtClean="0">
+                <a:latin typeface="Arial" panose="020B0604020202020204" pitchFamily="34" charset="0"/>
+                <a:cs typeface="B Homa" panose="00000400000000000000" pitchFamily="2" charset="-78"/>
+              </a:rPr>
+              <a:t> برای طراحی های </a:t>
+            </a:r>
+            <a:r>
+              <a:rPr lang="en-US" altLang="fa-IR" sz="2400" dirty="0" smtClean="0">
+                <a:latin typeface="A Hayat" panose="020B0800040000020004" pitchFamily="34" charset="-78"/>
+                <a:ea typeface="A Hayat" panose="020B0800040000020004" pitchFamily="34" charset="-78"/>
+                <a:cs typeface="A Hayat" panose="020B0800040000020004" pitchFamily="34" charset="-78"/>
+              </a:rPr>
+              <a:t>CSS</a:t>
+            </a:r>
+            <a:r>
+              <a:rPr lang="fa-IR" altLang="fa-IR" sz="2400" dirty="0" smtClean="0">
+                <a:latin typeface="Arial" panose="020B0604020202020204" pitchFamily="34" charset="0"/>
+                <a:cs typeface="B Homa" panose="00000400000000000000" pitchFamily="2" charset="-78"/>
+              </a:rPr>
+              <a:t> در سایت</a:t>
+            </a:r>
+            <a:endParaRPr kumimoji="0" lang="fa-IR" altLang="fa-IR" sz="2400" b="0" i="0" u="none" strike="noStrike" cap="none" normalizeH="0" baseline="0" dirty="0" smtClean="0">
+              <a:ln>
+                <a:noFill/>
+              </a:ln>
+              <a:solidFill>
+                <a:schemeClr val="tx1"/>
+              </a:solidFill>
+              <a:effectLst/>
+              <a:latin typeface="Arial" panose="020B0604020202020204" pitchFamily="34" charset="0"/>
+              <a:cs typeface="B Homa" panose="00000400000000000000" pitchFamily="2" charset="-78"/>
+            </a:endParaRPr>
+          </a:p>
+        </p:txBody>
+      </p:sp>
     </p:spTree>
   </p:cSld>
   <p:clrMapOvr>

</xml_diff>